<commit_message>
updated week 4 lecture
</commit_message>
<xml_diff>
--- a/lectures/week_4_philosophy/le4_statistical_philosophy.pptx
+++ b/lectures/week_4_philosophy/le4_statistical_philosophy.pptx
@@ -11,14 +11,14 @@
     <p:sldId id="256" r:id="rId2"/>
     <p:sldId id="304" r:id="rId3"/>
     <p:sldId id="305" r:id="rId4"/>
-    <p:sldId id="257" r:id="rId5"/>
-    <p:sldId id="270" r:id="rId6"/>
-    <p:sldId id="260" r:id="rId7"/>
-    <p:sldId id="258" r:id="rId8"/>
-    <p:sldId id="261" r:id="rId9"/>
-    <p:sldId id="263" r:id="rId10"/>
-    <p:sldId id="264" r:id="rId11"/>
-    <p:sldId id="265" r:id="rId12"/>
+    <p:sldId id="309" r:id="rId5"/>
+    <p:sldId id="257" r:id="rId6"/>
+    <p:sldId id="270" r:id="rId7"/>
+    <p:sldId id="260" r:id="rId8"/>
+    <p:sldId id="306" r:id="rId9"/>
+    <p:sldId id="307" r:id="rId10"/>
+    <p:sldId id="308" r:id="rId11"/>
+    <p:sldId id="258" r:id="rId12"/>
     <p:sldId id="262" r:id="rId13"/>
     <p:sldId id="266" r:id="rId14"/>
     <p:sldId id="267" r:id="rId15"/>
@@ -251,7 +251,7 @@
           <a:p>
             <a:fld id="{32295A16-C907-924E-9309-D28CB357FA15}" type="datetimeFigureOut">
               <a:rPr lang="en-US" smtClean="0"/>
-              <a:t>2/11/20</a:t>
+              <a:t>2/9/21</a:t>
             </a:fld>
             <a:endParaRPr lang="en-US"/>
           </a:p>
@@ -518,6 +518,149 @@
 </p:notesMaster>
 </file>
 
+<file path=ppt/notesSlides/notesSlide1.xml><?xml version="1.0" encoding="utf-8"?>
+<p:notes xmlns:a="http://schemas.openxmlformats.org/drawingml/2006/main" xmlns:r="http://schemas.openxmlformats.org/officeDocument/2006/relationships" xmlns:p="http://schemas.openxmlformats.org/presentationml/2006/main">
+  <p:cSld>
+    <p:spTree>
+      <p:nvGrpSpPr>
+        <p:cNvPr id="1" name=""/>
+        <p:cNvGrpSpPr/>
+        <p:nvPr/>
+      </p:nvGrpSpPr>
+      <p:grpSpPr>
+        <a:xfrm>
+          <a:off x="0" y="0"/>
+          <a:ext cx="0" cy="0"/>
+          <a:chOff x="0" y="0"/>
+          <a:chExt cx="0" cy="0"/>
+        </a:xfrm>
+      </p:grpSpPr>
+      <p:sp>
+        <p:nvSpPr>
+          <p:cNvPr id="2" name="Slide Image Placeholder 1"/>
+          <p:cNvSpPr>
+            <a:spLocks noGrp="1" noRot="1" noChangeAspect="1"/>
+          </p:cNvSpPr>
+          <p:nvPr>
+            <p:ph type="sldImg"/>
+          </p:nvPr>
+        </p:nvSpPr>
+        <p:spPr/>
+      </p:sp>
+      <p:sp>
+        <p:nvSpPr>
+          <p:cNvPr id="3" name="Notes Placeholder 2"/>
+          <p:cNvSpPr>
+            <a:spLocks noGrp="1"/>
+          </p:cNvSpPr>
+          <p:nvPr>
+            <p:ph type="body" idx="1"/>
+          </p:nvPr>
+        </p:nvSpPr>
+        <p:spPr/>
+        <p:txBody>
+          <a:bodyPr/>
+          <a:lstStyle/>
+          <a:p>
+            <a:r>
+              <a:rPr lang="en-US" dirty="0"/>
+              <a:t>http://</a:t>
+            </a:r>
+            <a:r>
+              <a:rPr lang="en-US" dirty="0" err="1"/>
+              <a:t>biometry.github.io</a:t>
+            </a:r>
+            <a:r>
+              <a:rPr lang="en-US" dirty="0"/>
+              <a:t>/APES//</a:t>
+            </a:r>
+            <a:r>
+              <a:rPr lang="en-US" dirty="0" err="1"/>
+              <a:t>LectureNotes</a:t>
+            </a:r>
+            <a:r>
+              <a:rPr lang="en-US" dirty="0"/>
+              <a:t>/</a:t>
+            </a:r>
+            <a:r>
+              <a:rPr lang="en-US" dirty="0" err="1"/>
+              <a:t>StatsCafe</a:t>
+            </a:r>
+            <a:r>
+              <a:rPr lang="en-US" dirty="0"/>
+              <a:t>/</a:t>
+            </a:r>
+            <a:r>
+              <a:rPr lang="en-US" dirty="0" err="1"/>
+              <a:t>Linear_models_jags.html</a:t>
+            </a:r>
+            <a:r>
+              <a:rPr lang="en-US" dirty="0"/>
+              <a:t>; https://</a:t>
+            </a:r>
+            <a:r>
+              <a:rPr lang="en-US" dirty="0" err="1"/>
+              <a:t>theoreticalecology.wordpress.com</a:t>
+            </a:r>
+            <a:r>
+              <a:rPr lang="en-US" dirty="0"/>
+              <a:t>/2010/09/17/metropolis-</a:t>
+            </a:r>
+            <a:r>
+              <a:rPr lang="en-US" dirty="0" err="1"/>
+              <a:t>hastings</a:t>
+            </a:r>
+            <a:r>
+              <a:rPr lang="en-US" dirty="0"/>
+              <a:t>-</a:t>
+            </a:r>
+            <a:r>
+              <a:rPr lang="en-US" dirty="0" err="1"/>
+              <a:t>mcmc</a:t>
+            </a:r>
+            <a:r>
+              <a:rPr lang="en-US" dirty="0"/>
+              <a:t>-in-r/</a:t>
+            </a:r>
+          </a:p>
+        </p:txBody>
+      </p:sp>
+      <p:sp>
+        <p:nvSpPr>
+          <p:cNvPr id="4" name="Slide Number Placeholder 3"/>
+          <p:cNvSpPr>
+            <a:spLocks noGrp="1"/>
+          </p:cNvSpPr>
+          <p:nvPr>
+            <p:ph type="sldNum" sz="quarter" idx="5"/>
+          </p:nvPr>
+        </p:nvSpPr>
+        <p:spPr/>
+        <p:txBody>
+          <a:bodyPr/>
+          <a:lstStyle/>
+          <a:p>
+            <a:fld id="{5FE30E6E-F7EB-0245-AF70-3D1BBC963643}" type="slidenum">
+              <a:rPr lang="en-US" smtClean="0"/>
+              <a:t>10</a:t>
+            </a:fld>
+            <a:endParaRPr lang="en-US"/>
+          </a:p>
+        </p:txBody>
+      </p:sp>
+    </p:spTree>
+    <p:extLst>
+      <p:ext uri="{BB962C8B-B14F-4D97-AF65-F5344CB8AC3E}">
+        <p14:creationId xmlns:p14="http://schemas.microsoft.com/office/powerpoint/2010/main" val="2849284789"/>
+      </p:ext>
+    </p:extLst>
+  </p:cSld>
+  <p:clrMapOvr>
+    <a:masterClrMapping/>
+  </p:clrMapOvr>
+</p:notes>
+</file>
+
 <file path=ppt/slideLayouts/slideLayout1.xml><?xml version="1.0" encoding="utf-8"?>
 <p:sldLayout xmlns:a="http://schemas.openxmlformats.org/drawingml/2006/main" xmlns:r="http://schemas.openxmlformats.org/officeDocument/2006/relationships" xmlns:p="http://schemas.openxmlformats.org/presentationml/2006/main" type="title" preserve="1">
   <p:cSld name="Title Slide">
@@ -647,7 +790,7 @@
           <a:p>
             <a:fld id="{367CFA25-B096-7943-A865-C4385416DEAE}" type="datetimeFigureOut">
               <a:rPr lang="en-US" smtClean="0"/>
-              <a:t>2/11/20</a:t>
+              <a:t>2/9/21</a:t>
             </a:fld>
             <a:endParaRPr lang="en-US"/>
           </a:p>
@@ -815,7 +958,7 @@
           <a:p>
             <a:fld id="{367CFA25-B096-7943-A865-C4385416DEAE}" type="datetimeFigureOut">
               <a:rPr lang="en-US" smtClean="0"/>
-              <a:t>2/11/20</a:t>
+              <a:t>2/9/21</a:t>
             </a:fld>
             <a:endParaRPr lang="en-US"/>
           </a:p>
@@ -993,7 +1136,7 @@
           <a:p>
             <a:fld id="{367CFA25-B096-7943-A865-C4385416DEAE}" type="datetimeFigureOut">
               <a:rPr lang="en-US" smtClean="0"/>
-              <a:t>2/11/20</a:t>
+              <a:t>2/9/21</a:t>
             </a:fld>
             <a:endParaRPr lang="en-US"/>
           </a:p>
@@ -1161,7 +1304,7 @@
           <a:p>
             <a:fld id="{367CFA25-B096-7943-A865-C4385416DEAE}" type="datetimeFigureOut">
               <a:rPr lang="en-US" smtClean="0"/>
-              <a:t>2/11/20</a:t>
+              <a:t>2/9/21</a:t>
             </a:fld>
             <a:endParaRPr lang="en-US"/>
           </a:p>
@@ -1406,7 +1549,7 @@
           <a:p>
             <a:fld id="{367CFA25-B096-7943-A865-C4385416DEAE}" type="datetimeFigureOut">
               <a:rPr lang="en-US" smtClean="0"/>
-              <a:t>2/11/20</a:t>
+              <a:t>2/9/21</a:t>
             </a:fld>
             <a:endParaRPr lang="en-US"/>
           </a:p>
@@ -1635,7 +1778,7 @@
           <a:p>
             <a:fld id="{367CFA25-B096-7943-A865-C4385416DEAE}" type="datetimeFigureOut">
               <a:rPr lang="en-US" smtClean="0"/>
-              <a:t>2/11/20</a:t>
+              <a:t>2/9/21</a:t>
             </a:fld>
             <a:endParaRPr lang="en-US"/>
           </a:p>
@@ -1999,7 +2142,7 @@
           <a:p>
             <a:fld id="{367CFA25-B096-7943-A865-C4385416DEAE}" type="datetimeFigureOut">
               <a:rPr lang="en-US" smtClean="0"/>
-              <a:t>2/11/20</a:t>
+              <a:t>2/9/21</a:t>
             </a:fld>
             <a:endParaRPr lang="en-US"/>
           </a:p>
@@ -2116,7 +2259,7 @@
           <a:p>
             <a:fld id="{367CFA25-B096-7943-A865-C4385416DEAE}" type="datetimeFigureOut">
               <a:rPr lang="en-US" smtClean="0"/>
-              <a:t>2/11/20</a:t>
+              <a:t>2/9/21</a:t>
             </a:fld>
             <a:endParaRPr lang="en-US"/>
           </a:p>
@@ -2211,7 +2354,7 @@
           <a:p>
             <a:fld id="{367CFA25-B096-7943-A865-C4385416DEAE}" type="datetimeFigureOut">
               <a:rPr lang="en-US" smtClean="0"/>
-              <a:t>2/11/20</a:t>
+              <a:t>2/9/21</a:t>
             </a:fld>
             <a:endParaRPr lang="en-US"/>
           </a:p>
@@ -2486,7 +2629,7 @@
           <a:p>
             <a:fld id="{367CFA25-B096-7943-A865-C4385416DEAE}" type="datetimeFigureOut">
               <a:rPr lang="en-US" smtClean="0"/>
-              <a:t>2/11/20</a:t>
+              <a:t>2/9/21</a:t>
             </a:fld>
             <a:endParaRPr lang="en-US"/>
           </a:p>
@@ -2738,7 +2881,7 @@
           <a:p>
             <a:fld id="{367CFA25-B096-7943-A865-C4385416DEAE}" type="datetimeFigureOut">
               <a:rPr lang="en-US" smtClean="0"/>
-              <a:t>2/11/20</a:t>
+              <a:t>2/9/21</a:t>
             </a:fld>
             <a:endParaRPr lang="en-US"/>
           </a:p>
@@ -2949,7 +3092,7 @@
           <a:p>
             <a:fld id="{367CFA25-B096-7943-A865-C4385416DEAE}" type="datetimeFigureOut">
               <a:rPr lang="en-US" smtClean="0"/>
-              <a:t>2/11/20</a:t>
+              <a:t>2/9/21</a:t>
             </a:fld>
             <a:endParaRPr lang="en-US"/>
           </a:p>
@@ -3432,7 +3575,13 @@
       </p:grpSpPr>
       <p:sp>
         <p:nvSpPr>
-          <p:cNvPr id="2" name="Title 1"/>
+          <p:cNvPr id="2" name="Title 1">
+            <a:extLst>
+              <a:ext uri="{FF2B5EF4-FFF2-40B4-BE49-F238E27FC236}">
+                <a16:creationId xmlns:a16="http://schemas.microsoft.com/office/drawing/2014/main" id="{A5D5996F-02E6-C143-9CC8-61AA70E6E023}"/>
+              </a:ext>
+            </a:extLst>
+          </p:cNvPr>
           <p:cNvSpPr>
             <a:spLocks noGrp="1"/>
           </p:cNvSpPr>
@@ -3447,14 +3596,20 @@
           <a:p>
             <a:r>
               <a:rPr lang="en-US" dirty="0"/>
-              <a:t>Vitamin A</a:t>
-            </a:r>
-          </a:p>
-        </p:txBody>
-      </p:sp>
-      <p:sp>
-        <p:nvSpPr>
-          <p:cNvPr id="3" name="Content Placeholder 2"/>
+              <a:t>Merging mathematical models with statistics</a:t>
+            </a:r>
+          </a:p>
+        </p:txBody>
+      </p:sp>
+      <p:sp>
+        <p:nvSpPr>
+          <p:cNvPr id="3" name="Content Placeholder 2">
+            <a:extLst>
+              <a:ext uri="{FF2B5EF4-FFF2-40B4-BE49-F238E27FC236}">
+                <a16:creationId xmlns:a16="http://schemas.microsoft.com/office/drawing/2014/main" id="{7E1BA5BB-F412-4049-8AB7-B053373A830E}"/>
+              </a:ext>
+            </a:extLst>
+          </p:cNvPr>
           <p:cNvSpPr>
             <a:spLocks noGrp="1"/>
           </p:cNvSpPr>
@@ -3464,12 +3619,14 @@
         </p:nvSpPr>
         <p:spPr/>
         <p:txBody>
-          <a:bodyPr/>
-          <a:lstStyle/>
-          <a:p>
-            <a:r>
-              <a:rPr lang="en-US" dirty="0"/>
-              <a:t>We measure the average heights of children raised with and without vitamin A supplements</a:t>
+          <a:bodyPr>
+            <a:normAutofit fontScale="62500" lnSpcReduction="20000"/>
+          </a:bodyPr>
+          <a:lstStyle/>
+          <a:p>
+            <a:r>
+              <a:rPr lang="en-US" dirty="0"/>
+              <a:t>Mathematical models can be fully built and simulated</a:t>
             </a:r>
           </a:p>
           <a:p>
@@ -3478,7 +3635,7 @@
           <a:p>
             <a:r>
               <a:rPr lang="en-US" dirty="0"/>
-              <a:t>Estimate: How much taller are the treated children, on average?</a:t>
+              <a:t>Determining the accuracy of a mathematical model usually requires statistics!</a:t>
             </a:r>
           </a:p>
           <a:p>
@@ -3487,16 +3644,88 @@
           <a:p>
             <a:r>
               <a:rPr lang="en-US" dirty="0"/>
-              <a:t>Confirmation: The supplements make children taller. </a:t>
-            </a:r>
-          </a:p>
-          <a:p>
+              <a:t>“Model fitting” or “Model inference” is the term used for this blend</a:t>
+            </a:r>
+          </a:p>
+          <a:p>
+            <a:r>
+              <a:rPr lang="en-US" dirty="0"/>
+              <a:t>Can be done in either Bayesian or Frequentist framework</a:t>
+            </a:r>
+          </a:p>
+          <a:p>
+            <a:pPr lvl="1"/>
+            <a:r>
+              <a:rPr lang="en-US" dirty="0"/>
+              <a:t>Guess a value for a parameter</a:t>
+            </a:r>
+          </a:p>
+          <a:p>
+            <a:pPr lvl="1"/>
+            <a:r>
+              <a:rPr lang="en-US" dirty="0"/>
+              <a:t>Simulate model based on guessed values</a:t>
+            </a:r>
+          </a:p>
+          <a:p>
+            <a:pPr lvl="1"/>
+            <a:r>
+              <a:rPr lang="en-US" dirty="0"/>
+              <a:t>Get an outcome (maybe # of individuals infected)</a:t>
+            </a:r>
+          </a:p>
+          <a:p>
+            <a:pPr lvl="1"/>
+            <a:r>
+              <a:rPr lang="en-US" dirty="0"/>
+              <a:t>Compare simulated outcome to real outcome, calculate error</a:t>
+            </a:r>
+          </a:p>
+          <a:p>
+            <a:pPr lvl="1"/>
+            <a:r>
+              <a:rPr lang="en-US" dirty="0"/>
+              <a:t>Based on error, make a new guess</a:t>
+            </a:r>
+            <a:br>
+              <a:rPr lang="en-US" dirty="0"/>
+            </a:br>
             <a:endParaRPr lang="en-US" dirty="0"/>
           </a:p>
           <a:p>
             <a:r>
               <a:rPr lang="en-US" dirty="0"/>
-              <a:t>Prediction:</a:t>
+              <a:t>Most of the sophisticated fitting algorithms are based on how you choose a guess and how you evaluate the error </a:t>
+            </a:r>
+          </a:p>
+          <a:p>
+            <a:pPr lvl="1"/>
+            <a:r>
+              <a:rPr lang="en-US" dirty="0"/>
+              <a:t>Bayesian – algorithm: Gibbs sampling – function “jags” in R2jags</a:t>
+            </a:r>
+          </a:p>
+          <a:p>
+            <a:pPr lvl="1"/>
+            <a:r>
+              <a:rPr lang="en-US" dirty="0"/>
+              <a:t>Frequentist – algorithm: </a:t>
+            </a:r>
+            <a:r>
+              <a:rPr lang="en-US" dirty="0" err="1"/>
+              <a:t>Nelder</a:t>
+            </a:r>
+            <a:r>
+              <a:rPr lang="en-US" dirty="0"/>
+              <a:t>-Mead - function ”</a:t>
+            </a:r>
+            <a:r>
+              <a:rPr lang="en-US" dirty="0" err="1"/>
+              <a:t>optim</a:t>
+            </a:r>
+            <a:r>
+              <a:rPr lang="en-US" dirty="0"/>
+              <a:t>” in R </a:t>
             </a:r>
           </a:p>
         </p:txBody>
@@ -3504,7 +3733,7 @@
     </p:spTree>
     <p:extLst>
       <p:ext uri="{BB962C8B-B14F-4D97-AF65-F5344CB8AC3E}">
-        <p14:creationId xmlns:p14="http://schemas.microsoft.com/office/powerpoint/2010/main" val="1651181045"/>
+        <p14:creationId xmlns:p14="http://schemas.microsoft.com/office/powerpoint/2010/main" val="2366520096"/>
       </p:ext>
     </p:extLst>
   </p:cSld>
@@ -3548,7 +3777,7 @@
           <a:p>
             <a:r>
               <a:rPr lang="en-US" dirty="0"/>
-              <a:t>Vitamin A</a:t>
+              <a:t>How to use statistics</a:t>
             </a:r>
           </a:p>
         </p:txBody>
@@ -3563,58 +3792,89 @@
             <p:ph idx="1"/>
           </p:nvPr>
         </p:nvSpPr>
-        <p:spPr/>
-        <p:txBody>
-          <a:bodyPr/>
-          <a:lstStyle/>
-          <a:p>
-            <a:r>
-              <a:rPr lang="en-US" dirty="0"/>
-              <a:t>We measure the average heights of children raised with and without vitamin A supplements</a:t>
-            </a:r>
-          </a:p>
-          <a:p>
-            <a:endParaRPr lang="en-US" dirty="0"/>
-          </a:p>
-          <a:p>
-            <a:r>
-              <a:rPr lang="en-US" dirty="0"/>
-              <a:t>Estimate: How much taller are the treated children, on average?</a:t>
-            </a:r>
-          </a:p>
-          <a:p>
-            <a:endParaRPr lang="en-US" dirty="0"/>
-          </a:p>
-          <a:p>
-            <a:r>
-              <a:rPr lang="en-US" dirty="0"/>
-              <a:t>Confirmation: The supplements make children taller. </a:t>
-            </a:r>
-          </a:p>
-          <a:p>
-            <a:endParaRPr lang="en-US" dirty="0"/>
-          </a:p>
-          <a:p>
-            <a:r>
-              <a:rPr lang="en-US" dirty="0"/>
-              <a:t>Prediction: Children give 1 mg/day of </a:t>
-            </a:r>
-            <a:r>
-              <a:rPr lang="en-US" dirty="0" err="1"/>
-              <a:t>Vit</a:t>
-            </a:r>
-            <a:r>
-              <a:rPr lang="en-US" dirty="0"/>
-              <a:t> A will be 4 +/-8 inches taller than children receiving no </a:t>
-            </a:r>
-            <a:r>
-              <a:rPr lang="en-US" dirty="0" err="1"/>
-              <a:t>Vit</a:t>
-            </a:r>
-            <a:r>
-              <a:rPr lang="en-US" dirty="0"/>
-              <a:t> A supplements. </a:t>
-            </a:r>
+        <p:spPr>
+          <a:xfrm>
+            <a:off x="838200" y="1838151"/>
+            <a:ext cx="10515600" cy="4351338"/>
+          </a:xfrm>
+        </p:spPr>
+        <p:txBody>
+          <a:bodyPr/>
+          <a:lstStyle/>
+          <a:p>
+            <a:pPr fontAlgn="auto"/>
+            <a:r>
+              <a:rPr lang="en-US" dirty="0"/>
+              <a:t>We use statistics to confirm effects, estimate parameters, and predict outcomes </a:t>
+            </a:r>
+          </a:p>
+          <a:p>
+            <a:r>
+              <a:rPr lang="en-US" dirty="0"/>
+              <a:t>It usually rains when I’m in Cape Town, but mostly on Sunday. </a:t>
+            </a:r>
+            <a:endParaRPr lang="en-US" dirty="0">
+              <a:effectLst/>
+            </a:endParaRPr>
+          </a:p>
+          <a:p>
+            <a:r>
+              <a:rPr lang="en-US" dirty="0"/>
+              <a:t> </a:t>
+            </a:r>
+            <a:r>
+              <a:rPr lang="en-US" i="1" dirty="0"/>
+              <a:t>Confirmation: </a:t>
+            </a:r>
+            <a:r>
+              <a:rPr lang="en-US" dirty="0"/>
+              <a:t>In Cape Town, it rains more on Sundays than other days </a:t>
+            </a:r>
+            <a:endParaRPr lang="en-US" dirty="0">
+              <a:effectLst/>
+            </a:endParaRPr>
+          </a:p>
+          <a:p>
+            <a:r>
+              <a:rPr lang="en-US" dirty="0"/>
+              <a:t> </a:t>
+            </a:r>
+            <a:r>
+              <a:rPr lang="en-US" i="1" dirty="0"/>
+              <a:t>Estimation: </a:t>
+            </a:r>
+            <a:r>
+              <a:rPr lang="en-US" dirty="0"/>
+              <a:t>In Cape Town, the </a:t>
+            </a:r>
+            <a:r>
+              <a:rPr lang="en-US" i="1" dirty="0"/>
+              <a:t>odds </a:t>
+            </a:r>
+            <a:r>
+              <a:rPr lang="en-US" dirty="0"/>
+              <a:t>of rain on Sunday are 1.6–2.2 times higher than on other days </a:t>
+            </a:r>
+            <a:endParaRPr lang="en-US" dirty="0">
+              <a:effectLst/>
+            </a:endParaRPr>
+          </a:p>
+          <a:p>
+            <a:r>
+              <a:rPr lang="en-US" dirty="0"/>
+              <a:t> </a:t>
+            </a:r>
+            <a:r>
+              <a:rPr lang="en-US" i="1" dirty="0"/>
+              <a:t>Prediction: </a:t>
+            </a:r>
+            <a:r>
+              <a:rPr lang="en-US" dirty="0"/>
+              <a:t>I am confident that it will rain at least one Sunday the next time I travel to Cape Town for 4 weeks</a:t>
+            </a:r>
+            <a:endParaRPr lang="en-US" dirty="0">
+              <a:effectLst/>
+            </a:endParaRPr>
           </a:p>
           <a:p>
             <a:endParaRPr lang="en-US" dirty="0"/>
@@ -3624,7 +3884,7 @@
     </p:spTree>
     <p:extLst>
       <p:ext uri="{BB962C8B-B14F-4D97-AF65-F5344CB8AC3E}">
-        <p14:creationId xmlns:p14="http://schemas.microsoft.com/office/powerpoint/2010/main" val="1422380752"/>
+        <p14:creationId xmlns:p14="http://schemas.microsoft.com/office/powerpoint/2010/main" val="413244071"/>
       </p:ext>
     </p:extLst>
   </p:cSld>
@@ -3707,11 +3967,11 @@
           <a:p>
             <a:r>
               <a:rPr lang="en-US" dirty="0"/>
-              <a:t>We use statistics (like </a:t>
+              <a:t>We use statistics (like confidence intervals, model coefficients/parameters</a:t>
             </a:r>
             <a:r>
               <a:rPr lang="en-US" i="1" dirty="0"/>
-              <a:t>confidence intervals)</a:t>
+              <a:t>)</a:t>
             </a:r>
             <a:r>
               <a:rPr lang="en-US" dirty="0"/>
@@ -7263,7 +7523,13 @@
       </p:grpSpPr>
       <p:sp>
         <p:nvSpPr>
-          <p:cNvPr id="2" name="Title 1"/>
+          <p:cNvPr id="2" name="Title 1">
+            <a:extLst>
+              <a:ext uri="{FF2B5EF4-FFF2-40B4-BE49-F238E27FC236}">
+                <a16:creationId xmlns:a16="http://schemas.microsoft.com/office/drawing/2014/main" id="{861473AE-C073-CF41-8879-457A195831D3}"/>
+              </a:ext>
+            </a:extLst>
+          </p:cNvPr>
           <p:cNvSpPr>
             <a:spLocks noGrp="1"/>
           </p:cNvSpPr>
@@ -7278,14 +7544,20 @@
           <a:p>
             <a:r>
               <a:rPr lang="en-US" dirty="0"/>
-              <a:t>Goals</a:t>
-            </a:r>
-          </a:p>
-        </p:txBody>
-      </p:sp>
-      <p:sp>
-        <p:nvSpPr>
-          <p:cNvPr id="3" name="Content Placeholder 2"/>
+              <a:t>Discussion on Thursday</a:t>
+            </a:r>
+          </a:p>
+        </p:txBody>
+      </p:sp>
+      <p:sp>
+        <p:nvSpPr>
+          <p:cNvPr id="3" name="Content Placeholder 2">
+            <a:extLst>
+              <a:ext uri="{FF2B5EF4-FFF2-40B4-BE49-F238E27FC236}">
+                <a16:creationId xmlns:a16="http://schemas.microsoft.com/office/drawing/2014/main" id="{704B10AF-8058-CB45-8F84-BD7DC770E9EB}"/>
+              </a:ext>
+            </a:extLst>
+          </p:cNvPr>
           <p:cNvSpPr>
             <a:spLocks noGrp="1"/>
           </p:cNvSpPr>
@@ -7296,39 +7568,56 @@
         <p:spPr/>
         <p:txBody>
           <a:bodyPr>
-            <a:normAutofit/>
+            <a:normAutofit lnSpcReduction="10000"/>
           </a:bodyPr>
           <a:lstStyle/>
           <a:p>
             <a:r>
-              <a:rPr lang="en-US" sz="3600" dirty="0"/>
-              <a:t>Articulate some statistical philosophies and describe similarities and differences</a:t>
-            </a:r>
-          </a:p>
-          <a:p>
-            <a:endParaRPr lang="en-US" sz="3600" dirty="0"/>
-          </a:p>
-          <a:p>
-            <a:r>
-              <a:rPr lang="en-US" sz="3600" dirty="0"/>
-              <a:t>Understand P-values and their limitations</a:t>
-            </a:r>
-          </a:p>
-          <a:p>
-            <a:endParaRPr lang="en-US" sz="3600" dirty="0"/>
-          </a:p>
-          <a:p>
-            <a:r>
-              <a:rPr lang="en-US" sz="3600" dirty="0"/>
-              <a:t>Understand effect sizes and their importance</a:t>
-            </a:r>
+              <a:rPr lang="en-US" dirty="0"/>
+              <a:t>Thursday we will have a class discussion</a:t>
+            </a:r>
+          </a:p>
+          <a:p>
+            <a:pPr lvl="1"/>
+            <a:r>
+              <a:rPr lang="en-US" dirty="0"/>
+              <a:t>Please be prepared to speak at least once</a:t>
+            </a:r>
+          </a:p>
+          <a:p>
+            <a:pPr lvl="1"/>
+            <a:r>
+              <a:rPr lang="en-US" dirty="0"/>
+              <a:t>Please turn on your cameras if you can</a:t>
+            </a:r>
+          </a:p>
+          <a:p>
+            <a:endParaRPr lang="en-US" dirty="0"/>
+          </a:p>
+          <a:p>
+            <a:r>
+              <a:rPr lang="en-US" dirty="0"/>
+              <a:t>Please read articles 1-4. They should not be too hard to get through. Think about your own statistical philosophy and be prepared to talk about what statistical inference means to you.</a:t>
+            </a:r>
+          </a:p>
+          <a:p>
+            <a:endParaRPr lang="en-US" dirty="0"/>
+          </a:p>
+          <a:p>
+            <a:r>
+              <a:rPr lang="en-US" dirty="0"/>
+              <a:t>Consider looking through articles 5 -8. Different articles will speak to different people.  </a:t>
+            </a:r>
+          </a:p>
+          <a:p>
+            <a:endParaRPr lang="en-US" dirty="0"/>
           </a:p>
         </p:txBody>
       </p:sp>
     </p:spTree>
     <p:extLst>
       <p:ext uri="{BB962C8B-B14F-4D97-AF65-F5344CB8AC3E}">
-        <p14:creationId xmlns:p14="http://schemas.microsoft.com/office/powerpoint/2010/main" val="392369591"/>
+        <p14:creationId xmlns:p14="http://schemas.microsoft.com/office/powerpoint/2010/main" val="1046764774"/>
       </p:ext>
     </p:extLst>
   </p:cSld>
@@ -7832,7 +8121,7 @@
           <a:p>
             <a:r>
               <a:rPr lang="en-US" dirty="0"/>
-              <a:t>Bayesian: what’s my model world? What is my prior belief about weather-weekday interactions.</a:t>
+              <a:t>Bayesian: what’s my model world? What is my prior belief about weather-weekday interactions?</a:t>
             </a:r>
           </a:p>
           <a:p>
@@ -8164,8 +8453,10 @@
           <a:bodyPr/>
           <a:lstStyle/>
           <a:p>
-            <a:pPr algn="ctr"/>
-            <a:endParaRPr lang="en-US" i="1" dirty="0"/>
+            <a:r>
+              <a:rPr lang="en-US" dirty="0"/>
+              <a:t>Goals</a:t>
+            </a:r>
           </a:p>
         </p:txBody>
       </p:sp>
@@ -8186,29 +8477,35 @@
           </a:bodyPr>
           <a:lstStyle/>
           <a:p>
-            <a:pPr marL="0" indent="0" algn="ctr">
-              <a:buNone/>
-            </a:pPr>
-            <a:r>
-              <a:rPr lang="en-US" sz="5400" i="1" dirty="0"/>
-              <a:t>But you said this class was about </a:t>
-            </a:r>
-            <a:r>
-              <a:rPr lang="en-US" sz="5400" b="1" i="1" dirty="0"/>
-              <a:t>doing</a:t>
-            </a:r>
-            <a:r>
-              <a:rPr lang="en-US" sz="5400" i="1" dirty="0"/>
-              <a:t> things!</a:t>
-            </a:r>
-            <a:endParaRPr lang="en-US" sz="5400" dirty="0"/>
+            <a:r>
+              <a:rPr lang="en-US" sz="3600" dirty="0"/>
+              <a:t>Articulate some statistical philosophies and describe similarities and differences</a:t>
+            </a:r>
+          </a:p>
+          <a:p>
+            <a:endParaRPr lang="en-US" sz="3600" dirty="0"/>
+          </a:p>
+          <a:p>
+            <a:r>
+              <a:rPr lang="en-US" sz="3600" dirty="0"/>
+              <a:t>Understand P-values and their limitations</a:t>
+            </a:r>
+          </a:p>
+          <a:p>
+            <a:endParaRPr lang="en-US" sz="3600" dirty="0"/>
+          </a:p>
+          <a:p>
+            <a:r>
+              <a:rPr lang="en-US" sz="3600" dirty="0"/>
+              <a:t>Understand effect sizes and their importance</a:t>
+            </a:r>
           </a:p>
         </p:txBody>
       </p:sp>
     </p:spTree>
     <p:extLst>
       <p:ext uri="{BB962C8B-B14F-4D97-AF65-F5344CB8AC3E}">
-        <p14:creationId xmlns:p14="http://schemas.microsoft.com/office/powerpoint/2010/main" val="902394033"/>
+        <p14:creationId xmlns:p14="http://schemas.microsoft.com/office/powerpoint/2010/main" val="392369591"/>
       </p:ext>
     </p:extLst>
   </p:cSld>
@@ -8250,10 +8547,8 @@
           <a:bodyPr/>
           <a:lstStyle/>
           <a:p>
-            <a:r>
-              <a:rPr lang="en-US" dirty="0"/>
-              <a:t>Discussion</a:t>
-            </a:r>
+            <a:pPr algn="ctr"/>
+            <a:endParaRPr lang="en-US" i="1" dirty="0"/>
           </a:p>
         </p:txBody>
       </p:sp>
@@ -8274,46 +8569,29 @@
           </a:bodyPr>
           <a:lstStyle/>
           <a:p>
-            <a:r>
-              <a:rPr lang="en-US" sz="3600" dirty="0"/>
-              <a:t>Formulate a hypothesis about your data, and discuss how you would test it statistically.</a:t>
-            </a:r>
-          </a:p>
-          <a:p>
-            <a:endParaRPr lang="en-US" sz="3600" dirty="0"/>
-          </a:p>
-        </p:txBody>
-      </p:sp>
-      <p:sp>
-        <p:nvSpPr>
-          <p:cNvPr id="4" name="TextBox 3"/>
-          <p:cNvSpPr txBox="1"/>
-          <p:nvPr/>
-        </p:nvSpPr>
-        <p:spPr>
-          <a:xfrm>
-            <a:off x="5633357" y="5012871"/>
-            <a:ext cx="184731" cy="369332"/>
-          </a:xfrm>
-          <a:prstGeom prst="rect">
-            <a:avLst/>
-          </a:prstGeom>
-          <a:noFill/>
-        </p:spPr>
-        <p:txBody>
-          <a:bodyPr wrap="none" rtlCol="0">
-            <a:spAutoFit/>
-          </a:bodyPr>
-          <a:lstStyle/>
-          <a:p>
-            <a:endParaRPr lang="en-US" dirty="0"/>
+            <a:pPr marL="0" indent="0" algn="ctr">
+              <a:buNone/>
+            </a:pPr>
+            <a:r>
+              <a:rPr lang="en-US" sz="5400" i="1" dirty="0"/>
+              <a:t>But you said this class was about </a:t>
+            </a:r>
+            <a:r>
+              <a:rPr lang="en-US" sz="5400" b="1" i="1" dirty="0"/>
+              <a:t>doing</a:t>
+            </a:r>
+            <a:r>
+              <a:rPr lang="en-US" sz="5400" i="1" dirty="0"/>
+              <a:t> things!</a:t>
+            </a:r>
+            <a:endParaRPr lang="en-US" sz="5400" dirty="0"/>
           </a:p>
         </p:txBody>
       </p:sp>
     </p:spTree>
     <p:extLst>
       <p:ext uri="{BB962C8B-B14F-4D97-AF65-F5344CB8AC3E}">
-        <p14:creationId xmlns:p14="http://schemas.microsoft.com/office/powerpoint/2010/main" val="1261167362"/>
+        <p14:creationId xmlns:p14="http://schemas.microsoft.com/office/powerpoint/2010/main" val="902394033"/>
       </p:ext>
     </p:extLst>
   </p:cSld>
@@ -8357,7 +8635,7 @@
           <a:p>
             <a:r>
               <a:rPr lang="en-US" dirty="0"/>
-              <a:t>How to use statistics</a:t>
+              <a:t>Discussion</a:t>
             </a:r>
           </a:p>
         </p:txBody>
@@ -8371,91 +8649,45 @@
           <p:nvPr>
             <p:ph idx="1"/>
           </p:nvPr>
+        </p:nvSpPr>
+        <p:spPr/>
+        <p:txBody>
+          <a:bodyPr>
+            <a:normAutofit/>
+          </a:bodyPr>
+          <a:lstStyle/>
+          <a:p>
+            <a:r>
+              <a:rPr lang="en-US" sz="3600" dirty="0"/>
+              <a:t>Formulate a hypothesis about your data, and discuss how you would test it statistically/computationally/mathematically.</a:t>
+            </a:r>
+          </a:p>
+          <a:p>
+            <a:endParaRPr lang="en-US" sz="3600" dirty="0"/>
+          </a:p>
+        </p:txBody>
+      </p:sp>
+      <p:sp>
+        <p:nvSpPr>
+          <p:cNvPr id="4" name="TextBox 3"/>
+          <p:cNvSpPr txBox="1"/>
+          <p:nvPr/>
         </p:nvSpPr>
         <p:spPr>
           <a:xfrm>
-            <a:off x="838200" y="1838151"/>
-            <a:ext cx="10515600" cy="4351338"/>
+            <a:off x="5633357" y="5012871"/>
+            <a:ext cx="184731" cy="369332"/>
           </a:xfrm>
+          <a:prstGeom prst="rect">
+            <a:avLst/>
+          </a:prstGeom>
+          <a:noFill/>
         </p:spPr>
         <p:txBody>
-          <a:bodyPr/>
-          <a:lstStyle/>
-          <a:p>
-            <a:pPr fontAlgn="auto"/>
-            <a:r>
-              <a:rPr lang="en-US" dirty="0"/>
-              <a:t>We use statistics to confirm effects, estimate parameters, and predict outcomes </a:t>
-            </a:r>
-          </a:p>
-          <a:p>
-            <a:r>
-              <a:rPr lang="en-US" dirty="0"/>
-              <a:t>It usually rains when I’m in Cape Town, but mostly on Sunday. </a:t>
-            </a:r>
-            <a:endParaRPr lang="en-US" dirty="0">
-              <a:effectLst/>
-            </a:endParaRPr>
-          </a:p>
-          <a:p>
-            <a:r>
-              <a:rPr lang="en-US" dirty="0"/>
-              <a:t> </a:t>
-            </a:r>
-            <a:r>
-              <a:rPr lang="en-US" i="1" dirty="0"/>
-              <a:t>Confirmation: </a:t>
-            </a:r>
-            <a:r>
-              <a:rPr lang="en-US" dirty="0"/>
-              <a:t>In Cape Town, it rains more on Sundays than other days </a:t>
-            </a:r>
-            <a:endParaRPr lang="en-US" dirty="0">
-              <a:effectLst/>
-            </a:endParaRPr>
-          </a:p>
-          <a:p>
-            <a:r>
-              <a:rPr lang="en-US" dirty="0"/>
-              <a:t> </a:t>
-            </a:r>
-            <a:r>
-              <a:rPr lang="en-US" i="1" dirty="0"/>
-              <a:t>Estimation: </a:t>
-            </a:r>
-            <a:r>
-              <a:rPr lang="en-US" dirty="0"/>
-              <a:t>In Cape Town, the </a:t>
-            </a:r>
-            <a:r>
-              <a:rPr lang="en-US" i="1" dirty="0"/>
-              <a:t>odds </a:t>
-            </a:r>
-            <a:r>
-              <a:rPr lang="en-US" dirty="0"/>
-              <a:t>of rain on Sunday are 1.6–2.2 times higher than on other days </a:t>
-            </a:r>
-            <a:endParaRPr lang="en-US" dirty="0">
-              <a:effectLst/>
-            </a:endParaRPr>
-          </a:p>
-          <a:p>
-            <a:r>
-              <a:rPr lang="en-US" dirty="0"/>
-              <a:t> </a:t>
-            </a:r>
-            <a:r>
-              <a:rPr lang="en-US" i="1" dirty="0"/>
-              <a:t>Prediction: </a:t>
-            </a:r>
-            <a:r>
-              <a:rPr lang="en-US" dirty="0"/>
-              <a:t>I am confident that it will rain at least one Sunday the next time I go </a:t>
-            </a:r>
-            <a:endParaRPr lang="en-US" dirty="0">
-              <a:effectLst/>
-            </a:endParaRPr>
-          </a:p>
+          <a:bodyPr wrap="none" rtlCol="0">
+            <a:spAutoFit/>
+          </a:bodyPr>
+          <a:lstStyle/>
           <a:p>
             <a:endParaRPr lang="en-US" dirty="0"/>
           </a:p>
@@ -8464,7 +8696,7 @@
     </p:spTree>
     <p:extLst>
       <p:ext uri="{BB962C8B-B14F-4D97-AF65-F5344CB8AC3E}">
-        <p14:creationId xmlns:p14="http://schemas.microsoft.com/office/powerpoint/2010/main" val="413244071"/>
+        <p14:creationId xmlns:p14="http://schemas.microsoft.com/office/powerpoint/2010/main" val="1261167362"/>
       </p:ext>
     </p:extLst>
   </p:cSld>
@@ -8493,7 +8725,13 @@
       </p:grpSpPr>
       <p:sp>
         <p:nvSpPr>
-          <p:cNvPr id="2" name="Title 1"/>
+          <p:cNvPr id="2" name="Title 1">
+            <a:extLst>
+              <a:ext uri="{FF2B5EF4-FFF2-40B4-BE49-F238E27FC236}">
+                <a16:creationId xmlns:a16="http://schemas.microsoft.com/office/drawing/2014/main" id="{006BA368-2E92-2A47-B3E4-4DAE0478802C}"/>
+              </a:ext>
+            </a:extLst>
+          </p:cNvPr>
           <p:cNvSpPr>
             <a:spLocks noGrp="1"/>
           </p:cNvSpPr>
@@ -8508,14 +8746,20 @@
           <a:p>
             <a:r>
               <a:rPr lang="en-US" dirty="0"/>
-              <a:t>Vitamin A</a:t>
-            </a:r>
-          </a:p>
-        </p:txBody>
-      </p:sp>
-      <p:sp>
-        <p:nvSpPr>
-          <p:cNvPr id="3" name="Content Placeholder 2"/>
+              <a:t>What is a model?</a:t>
+            </a:r>
+          </a:p>
+        </p:txBody>
+      </p:sp>
+      <p:sp>
+        <p:nvSpPr>
+          <p:cNvPr id="3" name="Content Placeholder 2">
+            <a:extLst>
+              <a:ext uri="{FF2B5EF4-FFF2-40B4-BE49-F238E27FC236}">
+                <a16:creationId xmlns:a16="http://schemas.microsoft.com/office/drawing/2014/main" id="{C046DC34-1BE6-2A4D-8B48-E6E9BF98F5BB}"/>
+              </a:ext>
+            </a:extLst>
+          </p:cNvPr>
           <p:cNvSpPr>
             <a:spLocks noGrp="1"/>
           </p:cNvSpPr>
@@ -8525,39 +8769,95 @@
         </p:nvSpPr>
         <p:spPr/>
         <p:txBody>
-          <a:bodyPr/>
-          <a:lstStyle/>
-          <a:p>
-            <a:r>
-              <a:rPr lang="en-US" dirty="0"/>
-              <a:t>We measure the average heights of children raised with and without vitamin A supplements</a:t>
-            </a:r>
-          </a:p>
-          <a:p>
+          <a:bodyPr>
+            <a:normAutofit lnSpcReduction="10000"/>
+          </a:bodyPr>
+          <a:lstStyle/>
+          <a:p>
+            <a:r>
+              <a:rPr lang="en-US" dirty="0"/>
+              <a:t>Different types of models:</a:t>
+            </a:r>
+          </a:p>
+          <a:p>
+            <a:pPr lvl="1"/>
+            <a:r>
+              <a:rPr lang="en-US" dirty="0"/>
+              <a:t>A </a:t>
+            </a:r>
+            <a:r>
+              <a:rPr lang="en-US" b="1" dirty="0"/>
+              <a:t>mathematical/computational model </a:t>
+            </a:r>
+            <a:r>
+              <a:rPr lang="en-US" dirty="0"/>
+              <a:t>is an abstract model that uses mathematical language to describe the behavior of a system</a:t>
+            </a:r>
+          </a:p>
+          <a:p>
+            <a:pPr lvl="2"/>
+            <a:r>
+              <a:rPr lang="en-US" dirty="0"/>
+              <a:t>Techniques vary, but often formulated using ODEs or PDEs</a:t>
+            </a:r>
+          </a:p>
+          <a:p>
+            <a:pPr lvl="3"/>
+            <a:r>
+              <a:rPr lang="en-US" dirty="0"/>
+              <a:t>Examples: predator-prey models, species competition models, SIR models</a:t>
+            </a:r>
+          </a:p>
+          <a:p>
+            <a:pPr lvl="3"/>
+            <a:r>
+              <a:rPr lang="en-US" dirty="0"/>
+              <a:t>Resources: A Biologists Guide to Mathematical Modeling – Otto &amp; Day; Math-Bio grad class in Math Dept (MAT 5516, alternately taught by Childs, Saucedo, or </a:t>
+            </a:r>
+            <a:r>
+              <a:rPr lang="en-US" dirty="0" err="1"/>
+              <a:t>Ciupe</a:t>
+            </a:r>
+            <a:r>
+              <a:rPr lang="en-US" dirty="0"/>
+              <a:t>)</a:t>
+            </a:r>
+          </a:p>
+          <a:p>
+            <a:pPr lvl="2"/>
             <a:endParaRPr lang="en-US" dirty="0"/>
           </a:p>
           <a:p>
-            <a:r>
-              <a:rPr lang="en-US" dirty="0"/>
-              <a:t>Estimate:</a:t>
-            </a:r>
-          </a:p>
-          <a:p>
+            <a:pPr lvl="1"/>
+            <a:r>
+              <a:rPr lang="en-US" dirty="0"/>
+              <a:t>A </a:t>
+            </a:r>
+            <a:r>
+              <a:rPr lang="en-US" b="1" dirty="0"/>
+              <a:t>statistical model</a:t>
+            </a:r>
+            <a:r>
+              <a:rPr lang="en-US" dirty="0"/>
+              <a:t> attempts to describe relationship between observed quantities and independent variables</a:t>
+            </a:r>
+          </a:p>
+          <a:p>
+            <a:pPr lvl="2"/>
+            <a:r>
+              <a:rPr lang="en-US" dirty="0"/>
+              <a:t>Techniques include linear models, generalized linear models, GAMMs, PCAs</a:t>
+            </a:r>
+          </a:p>
+          <a:p>
+            <a:pPr lvl="2"/>
             <a:endParaRPr lang="en-US" dirty="0"/>
           </a:p>
           <a:p>
-            <a:r>
-              <a:rPr lang="en-US" dirty="0"/>
-              <a:t>Confirmation:</a:t>
-            </a:r>
-          </a:p>
-          <a:p>
-            <a:endParaRPr lang="en-US" dirty="0"/>
-          </a:p>
-          <a:p>
-            <a:r>
-              <a:rPr lang="en-US" dirty="0"/>
-              <a:t>Prediction:</a:t>
+            <a:pPr lvl="1"/>
+            <a:r>
+              <a:rPr lang="en-US" dirty="0"/>
+              <a:t>Developing mathematical models is different from statistical analyses of data </a:t>
             </a:r>
           </a:p>
         </p:txBody>
@@ -8565,7 +8865,7 @@
     </p:spTree>
     <p:extLst>
       <p:ext uri="{BB962C8B-B14F-4D97-AF65-F5344CB8AC3E}">
-        <p14:creationId xmlns:p14="http://schemas.microsoft.com/office/powerpoint/2010/main" val="349728894"/>
+        <p14:creationId xmlns:p14="http://schemas.microsoft.com/office/powerpoint/2010/main" val="1806323708"/>
       </p:ext>
     </p:extLst>
   </p:cSld>
@@ -8594,7 +8894,13 @@
       </p:grpSpPr>
       <p:sp>
         <p:nvSpPr>
-          <p:cNvPr id="2" name="Title 1"/>
+          <p:cNvPr id="2" name="Title 1">
+            <a:extLst>
+              <a:ext uri="{FF2B5EF4-FFF2-40B4-BE49-F238E27FC236}">
+                <a16:creationId xmlns:a16="http://schemas.microsoft.com/office/drawing/2014/main" id="{E7CC58F8-7120-EC4B-8177-E755DB1BD2F1}"/>
+              </a:ext>
+            </a:extLst>
+          </p:cNvPr>
           <p:cNvSpPr>
             <a:spLocks noGrp="1"/>
           </p:cNvSpPr>
@@ -8609,14 +8915,20 @@
           <a:p>
             <a:r>
               <a:rPr lang="en-US" dirty="0"/>
-              <a:t>Vitamin A</a:t>
-            </a:r>
-          </a:p>
-        </p:txBody>
-      </p:sp>
-      <p:sp>
-        <p:nvSpPr>
-          <p:cNvPr id="3" name="Content Placeholder 2"/>
+              <a:t>Why build a mathematical model?</a:t>
+            </a:r>
+          </a:p>
+        </p:txBody>
+      </p:sp>
+      <p:sp>
+        <p:nvSpPr>
+          <p:cNvPr id="3" name="Content Placeholder 2">
+            <a:extLst>
+              <a:ext uri="{FF2B5EF4-FFF2-40B4-BE49-F238E27FC236}">
+                <a16:creationId xmlns:a16="http://schemas.microsoft.com/office/drawing/2014/main" id="{5753E65A-8D19-B846-A3C9-A345CA788960}"/>
+              </a:ext>
+            </a:extLst>
+          </p:cNvPr>
           <p:cNvSpPr>
             <a:spLocks noGrp="1"/>
           </p:cNvSpPr>
@@ -8626,30 +8938,36 @@
         </p:nvSpPr>
         <p:spPr/>
         <p:txBody>
-          <a:bodyPr/>
-          <a:lstStyle/>
-          <a:p>
-            <a:r>
-              <a:rPr lang="en-US" dirty="0"/>
-              <a:t>We measure the average heights of children raised with and without vitamin A supplements</a:t>
-            </a:r>
-          </a:p>
-          <a:p>
+          <a:bodyPr>
+            <a:normAutofit lnSpcReduction="10000"/>
+          </a:bodyPr>
+          <a:lstStyle/>
+          <a:p>
+            <a:r>
+              <a:rPr lang="en-US" dirty="0"/>
+              <a:t>Goals vary, but often focus on:</a:t>
+            </a:r>
+            <a:br>
+              <a:rPr lang="en-US" dirty="0"/>
+            </a:br>
             <a:endParaRPr lang="en-US" dirty="0"/>
           </a:p>
           <a:p>
-            <a:r>
-              <a:rPr lang="en-US" dirty="0"/>
-              <a:t>Estimate: How much taller are the treated children, on average?</a:t>
-            </a:r>
-          </a:p>
-          <a:p>
+            <a:pPr lvl="1"/>
+            <a:r>
+              <a:rPr lang="en-US" dirty="0"/>
+              <a:t>Understanding nature and how something changes over time</a:t>
+            </a:r>
+            <a:br>
+              <a:rPr lang="en-US" dirty="0"/>
+            </a:br>
             <a:endParaRPr lang="en-US" dirty="0"/>
           </a:p>
           <a:p>
-            <a:r>
-              <a:rPr lang="en-US" dirty="0"/>
-              <a:t>Confirmation: </a:t>
+            <a:pPr lvl="1"/>
+            <a:r>
+              <a:rPr lang="en-US" dirty="0"/>
+              <a:t>Making predictions about something that is going to happen in the future</a:t>
             </a:r>
           </a:p>
           <a:p>
@@ -8658,7 +8976,28 @@
           <a:p>
             <a:r>
               <a:rPr lang="en-US" dirty="0"/>
-              <a:t>Prediction:</a:t>
+              <a:t>Example: How many COVID-cases will occur on May 15 in Blacksburg?</a:t>
+            </a:r>
+          </a:p>
+          <a:p>
+            <a:pPr lvl="1"/>
+            <a:r>
+              <a:rPr lang="en-US" dirty="0"/>
+              <a:t>This is a difficult problem to solve with statistics</a:t>
+            </a:r>
+          </a:p>
+          <a:p>
+            <a:pPr lvl="2"/>
+            <a:r>
+              <a:rPr lang="en-US" dirty="0"/>
+              <a:t>Input: cases in previous time point, vaccine distribution, vaccine effectiveness, strain replacement and transmissibility, number of susceptible individuals remaining</a:t>
+            </a:r>
+          </a:p>
+          <a:p>
+            <a:pPr lvl="1"/>
+            <a:r>
+              <a:rPr lang="en-US" dirty="0"/>
+              <a:t>A mathematical model is a better tool to solve this problem</a:t>
             </a:r>
           </a:p>
         </p:txBody>
@@ -8666,7 +9005,7 @@
     </p:spTree>
     <p:extLst>
       <p:ext uri="{BB962C8B-B14F-4D97-AF65-F5344CB8AC3E}">
-        <p14:creationId xmlns:p14="http://schemas.microsoft.com/office/powerpoint/2010/main" val="1081421137"/>
+        <p14:creationId xmlns:p14="http://schemas.microsoft.com/office/powerpoint/2010/main" val="3550102867"/>
       </p:ext>
     </p:extLst>
   </p:cSld>

</xml_diff>

<commit_message>
sending week 5 updates
</commit_message>
<xml_diff>
--- a/lectures/week_4_philosophy/le4_statistical_philosophy.pptx
+++ b/lectures/week_4_philosophy/le4_statistical_philosophy.pptx
@@ -652,6 +652,90 @@
     <p:extLst>
       <p:ext uri="{BB962C8B-B14F-4D97-AF65-F5344CB8AC3E}">
         <p14:creationId xmlns:p14="http://schemas.microsoft.com/office/powerpoint/2010/main" val="2849284789"/>
+      </p:ext>
+    </p:extLst>
+  </p:cSld>
+  <p:clrMapOvr>
+    <a:masterClrMapping/>
+  </p:clrMapOvr>
+</p:notes>
+</file>
+
+<file path=ppt/notesSlides/notesSlide2.xml><?xml version="1.0" encoding="utf-8"?>
+<p:notes xmlns:a="http://schemas.openxmlformats.org/drawingml/2006/main" xmlns:r="http://schemas.openxmlformats.org/officeDocument/2006/relationships" xmlns:p="http://schemas.openxmlformats.org/presentationml/2006/main">
+  <p:cSld>
+    <p:spTree>
+      <p:nvGrpSpPr>
+        <p:cNvPr id="1" name=""/>
+        <p:cNvGrpSpPr/>
+        <p:nvPr/>
+      </p:nvGrpSpPr>
+      <p:grpSpPr>
+        <a:xfrm>
+          <a:off x="0" y="0"/>
+          <a:ext cx="0" cy="0"/>
+          <a:chOff x="0" y="0"/>
+          <a:chExt cx="0" cy="0"/>
+        </a:xfrm>
+      </p:grpSpPr>
+      <p:sp>
+        <p:nvSpPr>
+          <p:cNvPr id="2" name="Slide Image Placeholder 1"/>
+          <p:cNvSpPr>
+            <a:spLocks noGrp="1" noRot="1" noChangeAspect="1"/>
+          </p:cNvSpPr>
+          <p:nvPr>
+            <p:ph type="sldImg"/>
+          </p:nvPr>
+        </p:nvSpPr>
+        <p:spPr/>
+      </p:sp>
+      <p:sp>
+        <p:nvSpPr>
+          <p:cNvPr id="3" name="Notes Placeholder 2"/>
+          <p:cNvSpPr>
+            <a:spLocks noGrp="1"/>
+          </p:cNvSpPr>
+          <p:nvPr>
+            <p:ph type="body" idx="1"/>
+          </p:nvPr>
+        </p:nvSpPr>
+        <p:spPr/>
+        <p:txBody>
+          <a:bodyPr/>
+          <a:lstStyle/>
+          <a:p>
+            <a:endParaRPr lang="en-US"/>
+          </a:p>
+        </p:txBody>
+      </p:sp>
+      <p:sp>
+        <p:nvSpPr>
+          <p:cNvPr id="4" name="Slide Number Placeholder 3"/>
+          <p:cNvSpPr>
+            <a:spLocks noGrp="1"/>
+          </p:cNvSpPr>
+          <p:nvPr>
+            <p:ph type="sldNum" sz="quarter" idx="5"/>
+          </p:nvPr>
+        </p:nvSpPr>
+        <p:spPr/>
+        <p:txBody>
+          <a:bodyPr/>
+          <a:lstStyle/>
+          <a:p>
+            <a:fld id="{5FE30E6E-F7EB-0245-AF70-3D1BBC963643}" type="slidenum">
+              <a:rPr lang="en-US" smtClean="0"/>
+              <a:t>47</a:t>
+            </a:fld>
+            <a:endParaRPr lang="en-US"/>
+          </a:p>
+        </p:txBody>
+      </p:sp>
+    </p:spTree>
+    <p:extLst>
+      <p:ext uri="{BB962C8B-B14F-4D97-AF65-F5344CB8AC3E}">
+        <p14:creationId xmlns:p14="http://schemas.microsoft.com/office/powerpoint/2010/main" val="1394501120"/>
       </p:ext>
     </p:extLst>
   </p:cSld>

</xml_diff>